<commit_message>
Update Ring - License = Ring Version.
</commit_message>
<xml_diff>
--- a/presentation/Ring.pptx
+++ b/presentation/Ring.pptx
@@ -255,7 +255,7 @@
             <a:fld id="{734F3E59-2A89-4B58-A144-DE0565CD10A3}" type="datetimeFigureOut">
               <a:rPr lang="en-US" smtClean="0"/>
               <a:pPr/>
-              <a:t>10/26/2016</a:t>
+              <a:t>5/15/2017</a:t>
             </a:fld>
             <a:endParaRPr lang="en-US"/>
           </a:p>
@@ -949,7 +949,7 @@
             <a:fld id="{24E88B5C-CE1F-417E-9D80-6FD613872C83}" type="datetimeFigureOut">
               <a:rPr lang="en-US" smtClean="0"/>
               <a:pPr/>
-              <a:t>10/26/2016</a:t>
+              <a:t>5/15/2017</a:t>
             </a:fld>
             <a:endParaRPr lang="en-US"/>
           </a:p>
@@ -1174,7 +1174,7 @@
             <a:fld id="{24E88B5C-CE1F-417E-9D80-6FD613872C83}" type="datetimeFigureOut">
               <a:rPr lang="en-US" smtClean="0"/>
               <a:pPr/>
-              <a:t>10/26/2016</a:t>
+              <a:t>5/15/2017</a:t>
             </a:fld>
             <a:endParaRPr lang="en-US"/>
           </a:p>
@@ -1456,7 +1456,7 @@
             <a:fld id="{24E88B5C-CE1F-417E-9D80-6FD613872C83}" type="datetimeFigureOut">
               <a:rPr lang="en-US" smtClean="0"/>
               <a:pPr/>
-              <a:t>10/26/2016</a:t>
+              <a:t>5/15/2017</a:t>
             </a:fld>
             <a:endParaRPr lang="en-US"/>
           </a:p>
@@ -1637,7 +1637,7 @@
             <a:fld id="{24E88B5C-CE1F-417E-9D80-6FD613872C83}" type="datetimeFigureOut">
               <a:rPr lang="en-US" smtClean="0"/>
               <a:pPr/>
-              <a:t>10/26/2016</a:t>
+              <a:t>5/15/2017</a:t>
             </a:fld>
             <a:endParaRPr lang="en-US"/>
           </a:p>
@@ -1997,7 +1997,7 @@
             <a:fld id="{24E88B5C-CE1F-417E-9D80-6FD613872C83}" type="datetimeFigureOut">
               <a:rPr lang="en-US" smtClean="0"/>
               <a:pPr/>
-              <a:t>10/26/2016</a:t>
+              <a:t>5/15/2017</a:t>
             </a:fld>
             <a:endParaRPr lang="en-US"/>
           </a:p>
@@ -2286,7 +2286,7 @@
             <a:fld id="{24E88B5C-CE1F-417E-9D80-6FD613872C83}" type="datetimeFigureOut">
               <a:rPr lang="en-US" smtClean="0"/>
               <a:pPr/>
-              <a:t>10/26/2016</a:t>
+              <a:t>5/15/2017</a:t>
             </a:fld>
             <a:endParaRPr lang="en-US"/>
           </a:p>
@@ -2710,7 +2710,7 @@
             <a:fld id="{24E88B5C-CE1F-417E-9D80-6FD613872C83}" type="datetimeFigureOut">
               <a:rPr lang="en-US" smtClean="0"/>
               <a:pPr/>
-              <a:t>10/26/2016</a:t>
+              <a:t>5/15/2017</a:t>
             </a:fld>
             <a:endParaRPr lang="en-US"/>
           </a:p>
@@ -2827,7 +2827,7 @@
             <a:fld id="{24E88B5C-CE1F-417E-9D80-6FD613872C83}" type="datetimeFigureOut">
               <a:rPr lang="en-US" smtClean="0"/>
               <a:pPr/>
-              <a:t>10/26/2016</a:t>
+              <a:t>5/15/2017</a:t>
             </a:fld>
             <a:endParaRPr lang="en-US"/>
           </a:p>
@@ -2919,7 +2919,7 @@
             <a:fld id="{24E88B5C-CE1F-417E-9D80-6FD613872C83}" type="datetimeFigureOut">
               <a:rPr lang="en-US" smtClean="0"/>
               <a:pPr/>
-              <a:t>10/26/2016</a:t>
+              <a:t>5/15/2017</a:t>
             </a:fld>
             <a:endParaRPr lang="en-US"/>
           </a:p>
@@ -3199,7 +3199,7 @@
             <a:fld id="{24E88B5C-CE1F-417E-9D80-6FD613872C83}" type="datetimeFigureOut">
               <a:rPr lang="en-US" smtClean="0"/>
               <a:pPr/>
-              <a:t>10/26/2016</a:t>
+              <a:t>5/15/2017</a:t>
             </a:fld>
             <a:endParaRPr lang="en-US"/>
           </a:p>
@@ -3567,7 +3567,7 @@
             <a:fld id="{24E88B5C-CE1F-417E-9D80-6FD613872C83}" type="datetimeFigureOut">
               <a:rPr lang="en-US" smtClean="0"/>
               <a:pPr/>
-              <a:t>10/26/2016</a:t>
+              <a:t>5/15/2017</a:t>
             </a:fld>
             <a:endParaRPr lang="en-US"/>
           </a:p>
@@ -4006,7 +4006,7 @@
             <a:fld id="{24E88B5C-CE1F-417E-9D80-6FD613872C83}" type="datetimeFigureOut">
               <a:rPr lang="en-US" smtClean="0"/>
               <a:pPr/>
-              <a:t>10/26/2016</a:t>
+              <a:t>5/15/2017</a:t>
             </a:fld>
             <a:endParaRPr lang="en-US"/>
           </a:p>
@@ -4455,7 +4455,11 @@
             </a:br>
             <a:r>
               <a:rPr lang="en-US" dirty="0" smtClean="0"/>
-              <a:t>Version 1.1 </a:t>
+              <a:t>Free-Open Source</a:t>
+            </a:r>
+            <a:r>
+              <a:rPr lang="en-US" dirty="0" smtClean="0"/>
+              <a:t/>
             </a:r>
             <a:br>
               <a:rPr lang="en-US" dirty="0" smtClean="0"/>
@@ -5886,11 +5890,7 @@
             </a:br>
             <a:r>
               <a:rPr lang="en-US" sz="4000" dirty="0" smtClean="0"/>
-              <a:t>[3] Why Ring</a:t>
-            </a:r>
-            <a:r>
-              <a:rPr lang="en-US" sz="4000" dirty="0" smtClean="0"/>
-              <a:t>?</a:t>
+              <a:t>[3] Why Ring?</a:t>
             </a:r>
             <a:r>
               <a:rPr lang="ar-SA" sz="4000" dirty="0" smtClean="0"/>
@@ -5902,10 +5902,6 @@
             <a:r>
               <a:rPr lang="en-US" sz="4000" dirty="0" smtClean="0"/>
               <a:t>[4] Practical Demo</a:t>
-            </a:r>
-            <a:r>
-              <a:rPr lang="en-US" sz="4000" dirty="0" smtClean="0"/>
-              <a:t/>
             </a:r>
             <a:br>
               <a:rPr lang="en-US" sz="4000" dirty="0" smtClean="0"/>
@@ -9784,21 +9780,18 @@
               <a:rPr lang="en-US" sz="2800" dirty="0" smtClean="0"/>
               <a:t>Source Code (GitHub)</a:t>
             </a:r>
-            <a:endParaRPr lang="en-US" sz="2800" dirty="0" smtClean="0"/>
           </a:p>
           <a:p>
             <a:r>
               <a:rPr lang="en-US" sz="2800" dirty="0" smtClean="0"/>
               <a:t>Ring Notepad</a:t>
             </a:r>
-            <a:endParaRPr lang="en-US" sz="2800" dirty="0" smtClean="0"/>
           </a:p>
           <a:p>
             <a:r>
               <a:rPr lang="en-US" sz="2800" dirty="0" smtClean="0"/>
               <a:t>Games and Apps</a:t>
             </a:r>
-            <a:endParaRPr lang="en-US" sz="2800" dirty="0" smtClean="0"/>
           </a:p>
           <a:p>
             <a:r>

</xml_diff>